<commit_message>
javascript session testing platform
</commit_message>
<xml_diff>
--- a/Live Project and Developement/Odoo Tutorial/Tutorial ADDON ON ODOO (SYSTEM).pptx
+++ b/Live Project and Developement/Odoo Tutorial/Tutorial ADDON ON ODOO (SYSTEM).pptx
@@ -13,6 +13,8 @@
     <p:sldId id="261" r:id="rId7"/>
     <p:sldId id="262" r:id="rId8"/>
     <p:sldId id="263" r:id="rId9"/>
+    <p:sldId id="264" r:id="rId10"/>
+    <p:sldId id="265" r:id="rId11"/>
   </p:sldIdLst>
   <p:sldSz cx="12192000" cy="6858000"/>
   <p:notesSz cx="6858000" cy="9144000"/>
@@ -111,6 +113,11 @@
       </a:defRPr>
     </a:lvl9pPr>
   </p:defaultTextStyle>
+  <p:extLst>
+    <p:ext uri="{EFAFB233-063F-42B5-8137-9DF3F51BA10A}">
+      <p15:sldGuideLst xmlns:p15="http://schemas.microsoft.com/office/powerpoint/2012/main"/>
+    </p:ext>
+  </p:extLst>
 </p:presentation>
 </file>
 
@@ -449,7 +456,7 @@
           <a:p>
             <a:fld id="{C52C9D64-EBB6-4AC5-A7F4-6A89B0B52116}" type="datetimeFigureOut">
               <a:rPr lang="en-MY" smtClean="0"/>
-              <a:t>22/4/2025</a:t>
+              <a:t>23/4/2025</a:t>
             </a:fld>
             <a:endParaRPr lang="en-MY"/>
           </a:p>
@@ -1537,7 +1544,7 @@
           <a:p>
             <a:fld id="{C52C9D64-EBB6-4AC5-A7F4-6A89B0B52116}" type="datetimeFigureOut">
               <a:rPr lang="en-MY" smtClean="0"/>
-              <a:t>22/4/2025</a:t>
+              <a:t>23/4/2025</a:t>
             </a:fld>
             <a:endParaRPr lang="en-MY"/>
           </a:p>
@@ -2517,7 +2524,7 @@
           <a:p>
             <a:fld id="{C52C9D64-EBB6-4AC5-A7F4-6A89B0B52116}" type="datetimeFigureOut">
               <a:rPr lang="en-MY" smtClean="0"/>
-              <a:t>22/4/2025</a:t>
+              <a:t>23/4/2025</a:t>
             </a:fld>
             <a:endParaRPr lang="en-MY"/>
           </a:p>
@@ -3651,7 +3658,7 @@
           <a:p>
             <a:fld id="{C52C9D64-EBB6-4AC5-A7F4-6A89B0B52116}" type="datetimeFigureOut">
               <a:rPr lang="en-MY" smtClean="0"/>
-              <a:t>22/4/2025</a:t>
+              <a:t>23/4/2025</a:t>
             </a:fld>
             <a:endParaRPr lang="en-MY"/>
           </a:p>
@@ -4684,7 +4691,7 @@
           <a:p>
             <a:fld id="{C52C9D64-EBB6-4AC5-A7F4-6A89B0B52116}" type="datetimeFigureOut">
               <a:rPr lang="en-MY" smtClean="0"/>
-              <a:t>22/4/2025</a:t>
+              <a:t>23/4/2025</a:t>
             </a:fld>
             <a:endParaRPr lang="en-MY"/>
           </a:p>
@@ -5344,7 +5351,7 @@
           <a:p>
             <a:fld id="{C52C9D64-EBB6-4AC5-A7F4-6A89B0B52116}" type="datetimeFigureOut">
               <a:rPr lang="en-MY" smtClean="0"/>
-              <a:t>22/4/2025</a:t>
+              <a:t>23/4/2025</a:t>
             </a:fld>
             <a:endParaRPr lang="en-MY"/>
           </a:p>
@@ -6205,7 +6212,7 @@
           <a:p>
             <a:fld id="{C52C9D64-EBB6-4AC5-A7F4-6A89B0B52116}" type="datetimeFigureOut">
               <a:rPr lang="en-MY" smtClean="0"/>
-              <a:t>22/4/2025</a:t>
+              <a:t>23/4/2025</a:t>
             </a:fld>
             <a:endParaRPr lang="en-MY"/>
           </a:p>
@@ -6395,7 +6402,7 @@
           <a:p>
             <a:fld id="{C52C9D64-EBB6-4AC5-A7F4-6A89B0B52116}" type="datetimeFigureOut">
               <a:rPr lang="en-MY" smtClean="0"/>
-              <a:t>22/4/2025</a:t>
+              <a:t>23/4/2025</a:t>
             </a:fld>
             <a:endParaRPr lang="en-MY"/>
           </a:p>
@@ -7367,7 +7374,7 @@
           <a:p>
             <a:fld id="{C52C9D64-EBB6-4AC5-A7F4-6A89B0B52116}" type="datetimeFigureOut">
               <a:rPr lang="en-MY" smtClean="0"/>
-              <a:t>22/4/2025</a:t>
+              <a:t>23/4/2025</a:t>
             </a:fld>
             <a:endParaRPr lang="en-MY"/>
           </a:p>
@@ -7578,7 +7585,7 @@
           <a:p>
             <a:fld id="{C52C9D64-EBB6-4AC5-A7F4-6A89B0B52116}" type="datetimeFigureOut">
               <a:rPr lang="en-MY" smtClean="0"/>
-              <a:t>22/4/2025</a:t>
+              <a:t>23/4/2025</a:t>
             </a:fld>
             <a:endParaRPr lang="en-MY"/>
           </a:p>
@@ -8612,7 +8619,7 @@
           <a:p>
             <a:fld id="{C52C9D64-EBB6-4AC5-A7F4-6A89B0B52116}" type="datetimeFigureOut">
               <a:rPr lang="en-MY" smtClean="0"/>
-              <a:t>22/4/2025</a:t>
+              <a:t>23/4/2025</a:t>
             </a:fld>
             <a:endParaRPr lang="en-MY"/>
           </a:p>
@@ -8884,7 +8891,7 @@
           <a:p>
             <a:fld id="{C52C9D64-EBB6-4AC5-A7F4-6A89B0B52116}" type="datetimeFigureOut">
               <a:rPr lang="en-MY" smtClean="0"/>
-              <a:t>22/4/2025</a:t>
+              <a:t>23/4/2025</a:t>
             </a:fld>
             <a:endParaRPr lang="en-MY"/>
           </a:p>
@@ -9294,7 +9301,7 @@
           <a:p>
             <a:fld id="{C52C9D64-EBB6-4AC5-A7F4-6A89B0B52116}" type="datetimeFigureOut">
               <a:rPr lang="en-MY" smtClean="0"/>
-              <a:t>22/4/2025</a:t>
+              <a:t>23/4/2025</a:t>
             </a:fld>
             <a:endParaRPr lang="en-MY"/>
           </a:p>
@@ -9421,7 +9428,7 @@
           <a:p>
             <a:fld id="{C52C9D64-EBB6-4AC5-A7F4-6A89B0B52116}" type="datetimeFigureOut">
               <a:rPr lang="en-MY" smtClean="0"/>
-              <a:t>22/4/2025</a:t>
+              <a:t>23/4/2025</a:t>
             </a:fld>
             <a:endParaRPr lang="en-MY"/>
           </a:p>
@@ -9516,7 +9523,7 @@
           <a:p>
             <a:fld id="{C52C9D64-EBB6-4AC5-A7F4-6A89B0B52116}" type="datetimeFigureOut">
               <a:rPr lang="en-MY" smtClean="0"/>
-              <a:t>22/4/2025</a:t>
+              <a:t>23/4/2025</a:t>
             </a:fld>
             <a:endParaRPr lang="en-MY"/>
           </a:p>
@@ -10597,7 +10604,7 @@
           <a:p>
             <a:fld id="{C52C9D64-EBB6-4AC5-A7F4-6A89B0B52116}" type="datetimeFigureOut">
               <a:rPr lang="en-MY" smtClean="0"/>
-              <a:t>22/4/2025</a:t>
+              <a:t>23/4/2025</a:t>
             </a:fld>
             <a:endParaRPr lang="en-MY"/>
           </a:p>
@@ -11705,7 +11712,7 @@
           <a:p>
             <a:fld id="{C52C9D64-EBB6-4AC5-A7F4-6A89B0B52116}" type="datetimeFigureOut">
               <a:rPr lang="en-MY" smtClean="0"/>
-              <a:t>22/4/2025</a:t>
+              <a:t>23/4/2025</a:t>
             </a:fld>
             <a:endParaRPr lang="en-MY"/>
           </a:p>
@@ -12702,7 +12709,7 @@
           <a:p>
             <a:fld id="{C52C9D64-EBB6-4AC5-A7F4-6A89B0B52116}" type="datetimeFigureOut">
               <a:rPr lang="en-MY" smtClean="0"/>
-              <a:t>22/4/2025</a:t>
+              <a:t>23/4/2025</a:t>
             </a:fld>
             <a:endParaRPr lang="en-MY"/>
           </a:p>
@@ -13336,6 +13343,96 @@
 </p:sld>
 </file>
 
+<file path=ppt/slides/slide10.xml><?xml version="1.0" encoding="utf-8"?>
+<p:sld xmlns:a="http://schemas.openxmlformats.org/drawingml/2006/main" xmlns:r="http://schemas.openxmlformats.org/officeDocument/2006/relationships" xmlns:p="http://schemas.openxmlformats.org/presentationml/2006/main">
+  <p:cSld>
+    <p:spTree>
+      <p:nvGrpSpPr>
+        <p:cNvPr id="1" name=""/>
+        <p:cNvGrpSpPr/>
+        <p:nvPr/>
+      </p:nvGrpSpPr>
+      <p:grpSpPr>
+        <a:xfrm>
+          <a:off x="0" y="0"/>
+          <a:ext cx="0" cy="0"/>
+          <a:chOff x="0" y="0"/>
+          <a:chExt cx="0" cy="0"/>
+        </a:xfrm>
+      </p:grpSpPr>
+      <p:sp>
+        <p:nvSpPr>
+          <p:cNvPr id="2" name="Title 1">
+            <a:extLst>
+              <a:ext uri="{FF2B5EF4-FFF2-40B4-BE49-F238E27FC236}">
+                <a16:creationId xmlns:a16="http://schemas.microsoft.com/office/drawing/2014/main" id="{DDEEF36B-E335-4A35-6C5D-CDBA007A905B}"/>
+              </a:ext>
+            </a:extLst>
+          </p:cNvPr>
+          <p:cNvSpPr>
+            <a:spLocks noGrp="1"/>
+          </p:cNvSpPr>
+          <p:nvPr>
+            <p:ph type="title"/>
+          </p:nvPr>
+        </p:nvSpPr>
+        <p:spPr/>
+        <p:txBody>
+          <a:bodyPr/>
+          <a:lstStyle/>
+          <a:p>
+            <a:r>
+              <a:rPr lang="en-US" b="1" i="0" dirty="0">
+                <a:solidFill>
+                  <a:srgbClr val="F8FAFF"/>
+                </a:solidFill>
+                <a:effectLst/>
+                <a:latin typeface="DeepSeek-CJK-patch"/>
+              </a:rPr>
+              <a:t>Settings → Technical → User Interface → Views</a:t>
+            </a:r>
+            <a:endParaRPr lang="en-MY" dirty="0"/>
+          </a:p>
+        </p:txBody>
+      </p:sp>
+      <p:sp>
+        <p:nvSpPr>
+          <p:cNvPr id="3" name="Content Placeholder 2">
+            <a:extLst>
+              <a:ext uri="{FF2B5EF4-FFF2-40B4-BE49-F238E27FC236}">
+                <a16:creationId xmlns:a16="http://schemas.microsoft.com/office/drawing/2014/main" id="{BE2EDF76-1E0E-3A14-ABD9-4A4C2967A53A}"/>
+              </a:ext>
+            </a:extLst>
+          </p:cNvPr>
+          <p:cNvSpPr>
+            <a:spLocks noGrp="1"/>
+          </p:cNvSpPr>
+          <p:nvPr>
+            <p:ph idx="1"/>
+          </p:nvPr>
+        </p:nvSpPr>
+        <p:spPr/>
+        <p:txBody>
+          <a:bodyPr/>
+          <a:lstStyle/>
+          <a:p>
+            <a:endParaRPr lang="en-MY"/>
+          </a:p>
+        </p:txBody>
+      </p:sp>
+    </p:spTree>
+    <p:extLst>
+      <p:ext uri="{BB962C8B-B14F-4D97-AF65-F5344CB8AC3E}">
+        <p14:creationId xmlns:p14="http://schemas.microsoft.com/office/powerpoint/2010/main" val="1237858164"/>
+      </p:ext>
+    </p:extLst>
+  </p:cSld>
+  <p:clrMapOvr>
+    <a:masterClrMapping/>
+  </p:clrMapOvr>
+</p:sld>
+</file>
+
 <file path=ppt/slides/slide2.xml><?xml version="1.0" encoding="utf-8"?>
 <p:sld xmlns:a="http://schemas.openxmlformats.org/drawingml/2006/main" xmlns:r="http://schemas.openxmlformats.org/officeDocument/2006/relationships" xmlns:p="http://schemas.openxmlformats.org/presentationml/2006/main">
   <p:cSld>
@@ -14735,6 +14832,194 @@
     <p:extLst>
       <p:ext uri="{BB962C8B-B14F-4D97-AF65-F5344CB8AC3E}">
         <p14:creationId xmlns:p14="http://schemas.microsoft.com/office/powerpoint/2010/main" val="307814750"/>
+      </p:ext>
+    </p:extLst>
+  </p:cSld>
+  <p:clrMapOvr>
+    <a:masterClrMapping/>
+  </p:clrMapOvr>
+</p:sld>
+</file>
+
+<file path=ppt/slides/slide9.xml><?xml version="1.0" encoding="utf-8"?>
+<p:sld xmlns:a="http://schemas.openxmlformats.org/drawingml/2006/main" xmlns:r="http://schemas.openxmlformats.org/officeDocument/2006/relationships" xmlns:p="http://schemas.openxmlformats.org/presentationml/2006/main">
+  <p:cSld>
+    <p:spTree>
+      <p:nvGrpSpPr>
+        <p:cNvPr id="1" name=""/>
+        <p:cNvGrpSpPr/>
+        <p:nvPr/>
+      </p:nvGrpSpPr>
+      <p:grpSpPr>
+        <a:xfrm>
+          <a:off x="0" y="0"/>
+          <a:ext cx="0" cy="0"/>
+          <a:chOff x="0" y="0"/>
+          <a:chExt cx="0" cy="0"/>
+        </a:xfrm>
+      </p:grpSpPr>
+      <p:sp>
+        <p:nvSpPr>
+          <p:cNvPr id="2" name="Title 1">
+            <a:extLst>
+              <a:ext uri="{FF2B5EF4-FFF2-40B4-BE49-F238E27FC236}">
+                <a16:creationId xmlns:a16="http://schemas.microsoft.com/office/drawing/2014/main" id="{D885A619-C0E3-A6CA-4E48-29F40CD76710}"/>
+              </a:ext>
+            </a:extLst>
+          </p:cNvPr>
+          <p:cNvSpPr>
+            <a:spLocks noGrp="1"/>
+          </p:cNvSpPr>
+          <p:nvPr>
+            <p:ph type="title"/>
+          </p:nvPr>
+        </p:nvSpPr>
+        <p:spPr/>
+        <p:txBody>
+          <a:bodyPr/>
+          <a:lstStyle/>
+          <a:p>
+            <a:r>
+              <a:rPr lang="en-MY" b="1" i="0" dirty="0">
+                <a:solidFill>
+                  <a:srgbClr val="F8FAFF"/>
+                </a:solidFill>
+                <a:effectLst/>
+                <a:latin typeface="DeepSeek-CJK-patch"/>
+              </a:rPr>
+              <a:t>Settings → Technical → Database Structure → Models</a:t>
+            </a:r>
+            <a:r>
+              <a:rPr lang="en-MY" b="0" i="0" dirty="0">
+                <a:solidFill>
+                  <a:srgbClr val="F8FAFF"/>
+                </a:solidFill>
+                <a:effectLst/>
+                <a:latin typeface="DeepSeek-CJK-patch"/>
+              </a:rPr>
+              <a:t>.</a:t>
+            </a:r>
+            <a:endParaRPr lang="en-MY" dirty="0"/>
+          </a:p>
+        </p:txBody>
+      </p:sp>
+      <p:sp>
+        <p:nvSpPr>
+          <p:cNvPr id="3" name="Content Placeholder 2">
+            <a:extLst>
+              <a:ext uri="{FF2B5EF4-FFF2-40B4-BE49-F238E27FC236}">
+                <a16:creationId xmlns:a16="http://schemas.microsoft.com/office/drawing/2014/main" id="{D9CF7CE6-7EAF-1AB4-11F6-ACFB0F1FBD29}"/>
+              </a:ext>
+            </a:extLst>
+          </p:cNvPr>
+          <p:cNvSpPr>
+            <a:spLocks noGrp="1"/>
+          </p:cNvSpPr>
+          <p:nvPr>
+            <p:ph idx="1"/>
+          </p:nvPr>
+        </p:nvSpPr>
+        <p:spPr>
+          <a:xfrm>
+            <a:off x="813760" y="2090795"/>
+            <a:ext cx="5423267" cy="1730578"/>
+          </a:xfrm>
+        </p:spPr>
+        <p:txBody>
+          <a:bodyPr/>
+          <a:lstStyle/>
+          <a:p>
+            <a:r>
+              <a:rPr lang="en-MY" dirty="0"/>
+              <a:t>From here, edit the </a:t>
+            </a:r>
+            <a:r>
+              <a:rPr lang="en-MY" dirty="0" err="1"/>
+              <a:t>pos.printer</a:t>
+            </a:r>
+            <a:r>
+              <a:rPr lang="en-MY" dirty="0"/>
+              <a:t> and add new </a:t>
+            </a:r>
+          </a:p>
+          <a:p>
+            <a:r>
+              <a:rPr lang="en-MY" dirty="0"/>
+              <a:t>Add value: network</a:t>
+            </a:r>
+          </a:p>
+          <a:p>
+            <a:r>
+              <a:rPr lang="en-MY" dirty="0"/>
+              <a:t>Name: Use network printer (IP address)</a:t>
+            </a:r>
+          </a:p>
+        </p:txBody>
+      </p:sp>
+      <p:pic>
+        <p:nvPicPr>
+          <p:cNvPr id="5" name="Picture 4">
+            <a:extLst>
+              <a:ext uri="{FF2B5EF4-FFF2-40B4-BE49-F238E27FC236}">
+                <a16:creationId xmlns:a16="http://schemas.microsoft.com/office/drawing/2014/main" id="{EFDD94C6-E737-DF3C-95B1-BF5D702C84FB}"/>
+              </a:ext>
+            </a:extLst>
+          </p:cNvPr>
+          <p:cNvPicPr>
+            <a:picLocks noChangeAspect="1"/>
+          </p:cNvPicPr>
+          <p:nvPr/>
+        </p:nvPicPr>
+        <p:blipFill>
+          <a:blip r:embed="rId2"/>
+          <a:stretch>
+            <a:fillRect/>
+          </a:stretch>
+        </p:blipFill>
+        <p:spPr>
+          <a:xfrm>
+            <a:off x="6660106" y="1442623"/>
+            <a:ext cx="5008173" cy="4441709"/>
+          </a:xfrm>
+          <a:prstGeom prst="rect">
+            <a:avLst/>
+          </a:prstGeom>
+        </p:spPr>
+      </p:pic>
+      <p:pic>
+        <p:nvPicPr>
+          <p:cNvPr id="7" name="Picture 6">
+            <a:extLst>
+              <a:ext uri="{FF2B5EF4-FFF2-40B4-BE49-F238E27FC236}">
+                <a16:creationId xmlns:a16="http://schemas.microsoft.com/office/drawing/2014/main" id="{203B0864-38BB-D7A2-D413-15880C1632B8}"/>
+              </a:ext>
+            </a:extLst>
+          </p:cNvPr>
+          <p:cNvPicPr>
+            <a:picLocks noChangeAspect="1"/>
+          </p:cNvPicPr>
+          <p:nvPr/>
+        </p:nvPicPr>
+        <p:blipFill>
+          <a:blip r:embed="rId3"/>
+          <a:stretch>
+            <a:fillRect/>
+          </a:stretch>
+        </p:blipFill>
+        <p:spPr>
+          <a:xfrm>
+            <a:off x="1824251" y="3663477"/>
+            <a:ext cx="3858163" cy="2900767"/>
+          </a:xfrm>
+          <a:prstGeom prst="rect">
+            <a:avLst/>
+          </a:prstGeom>
+        </p:spPr>
+      </p:pic>
+    </p:spTree>
+    <p:extLst>
+      <p:ext uri="{BB962C8B-B14F-4D97-AF65-F5344CB8AC3E}">
+        <p14:creationId xmlns:p14="http://schemas.microsoft.com/office/powerpoint/2010/main" val="1097797893"/>
       </p:ext>
     </p:extLst>
   </p:cSld>

</xml_diff>